<commit_message>
Remove SSL support in websockets.dll
</commit_message>
<xml_diff>
--- a/building_mosquitto_on_windows.pptx
+++ b/building_mosquitto_on_windows.pptx
@@ -6,7 +6,7 @@
     <p:sldMasterId id="2147483660" r:id="rId2"/>
   </p:sldMasterIdLst>
   <p:notesMasterIdLst>
-    <p:notesMasterId r:id="rId13"/>
+    <p:notesMasterId r:id="rId14"/>
   </p:notesMasterIdLst>
   <p:sldIdLst>
     <p:sldId id="256" r:id="rId3"/>
@@ -14,11 +14,12 @@
     <p:sldId id="406" r:id="rId5"/>
     <p:sldId id="416" r:id="rId6"/>
     <p:sldId id="411" r:id="rId7"/>
-    <p:sldId id="412" r:id="rId8"/>
-    <p:sldId id="413" r:id="rId9"/>
-    <p:sldId id="414" r:id="rId10"/>
-    <p:sldId id="415" r:id="rId11"/>
-    <p:sldId id="408" r:id="rId12"/>
+    <p:sldId id="417" r:id="rId8"/>
+    <p:sldId id="412" r:id="rId9"/>
+    <p:sldId id="413" r:id="rId10"/>
+    <p:sldId id="414" r:id="rId11"/>
+    <p:sldId id="415" r:id="rId12"/>
+    <p:sldId id="408" r:id="rId13"/>
   </p:sldIdLst>
   <p:sldSz cx="9144000" cy="6858000" type="screen4x3"/>
   <p:notesSz cx="9939338" cy="14368463"/>
@@ -119,7 +120,7 @@
   </p:defaultTextStyle>
   <p:extLst>
     <p:ext uri="{EFAFB233-063F-42B5-8137-9DF3F51BA10A}">
-      <p15:sldGuideLst xmlns:p15="http://schemas.microsoft.com/office/powerpoint/2012/main" xmlns="">
+      <p15:sldGuideLst xmlns="" xmlns:p15="http://schemas.microsoft.com/office/powerpoint/2012/main">
         <p15:guide id="1" orient="horz" pos="1253">
           <p15:clr>
             <a:srgbClr val="A4A3A4"/>
@@ -224,7 +225,7 @@
             <a:fld id="{A453BED3-D4C1-449F-B847-9ED74AC1DE71}" type="datetimeFigureOut">
               <a:rPr lang="ko-KR" altLang="en-US" smtClean="0"/>
               <a:pPr/>
-              <a:t>2017-09-27</a:t>
+              <a:t>2017-10-13</a:t>
             </a:fld>
             <a:endParaRPr lang="ko-KR" altLang="en-US"/>
           </a:p>
@@ -2741,6 +2742,60 @@
           <a:chExt cx="0" cy="0"/>
         </a:xfrm>
       </p:grpSpPr>
+      <p:pic>
+        <p:nvPicPr>
+          <p:cNvPr id="34818" name="Picture 2"/>
+          <p:cNvPicPr>
+            <a:picLocks noChangeAspect="1" noChangeArrowheads="1"/>
+          </p:cNvPicPr>
+          <p:nvPr/>
+        </p:nvPicPr>
+        <p:blipFill>
+          <a:blip r:embed="rId2">
+            <a:extLst>
+              <a:ext uri="{28A0092B-C50C-407E-A947-70E740481C1C}">
+                <a14:useLocalDpi xmlns:a14="http://schemas.microsoft.com/office/drawing/2010/main" val="0"/>
+              </a:ext>
+            </a:extLst>
+          </a:blip>
+          <a:srcRect/>
+          <a:stretch>
+            <a:fillRect/>
+          </a:stretch>
+        </p:blipFill>
+        <p:spPr bwMode="auto">
+          <a:xfrm>
+            <a:off x="682179" y="2125389"/>
+            <a:ext cx="6316915" cy="4183931"/>
+          </a:xfrm>
+          <a:prstGeom prst="rect">
+            <a:avLst/>
+          </a:prstGeom>
+          <a:noFill/>
+          <a:ln>
+            <a:noFill/>
+          </a:ln>
+          <a:extLst>
+            <a:ext uri="{909E8E84-426E-40DD-AFC4-6F175D3DCCD1}">
+              <a14:hiddenFill xmlns:a14="http://schemas.microsoft.com/office/drawing/2010/main">
+                <a:solidFill>
+                  <a:schemeClr val="accent1"/>
+                </a:solidFill>
+              </a14:hiddenFill>
+            </a:ext>
+            <a:ext uri="{91240B29-F687-4F45-9708-019B960494DF}">
+              <a14:hiddenLine xmlns:a14="http://schemas.microsoft.com/office/drawing/2010/main" w="9525">
+                <a:solidFill>
+                  <a:schemeClr val="tx1"/>
+                </a:solidFill>
+                <a:miter lim="800000"/>
+                <a:headEnd/>
+                <a:tailEnd/>
+              </a14:hiddenLine>
+            </a:ext>
+          </a:extLst>
+        </p:spPr>
+      </p:pic>
       <p:sp>
         <p:nvSpPr>
           <p:cNvPr id="2" name="제목 1"/>
@@ -2757,8 +2812,20 @@
           <a:lstStyle/>
           <a:p>
             <a:r>
+              <a:rPr lang="en-US" altLang="ko-KR" dirty="0" err="1" smtClean="0"/>
+              <a:t>mosquitto</a:t>
+            </a:r>
+            <a:r>
+              <a:rPr lang="en-US" altLang="ko-KR" dirty="0" smtClean="0"/>
+              <a:t> </a:t>
+            </a:r>
+            <a:r>
               <a:rPr lang="ko-KR" altLang="en-US" dirty="0" smtClean="0"/>
-              <a:t>실행 환경 설정</a:t>
+              <a:t>프로젝트 설정 변경 </a:t>
+            </a:r>
+            <a:r>
+              <a:rPr lang="en-US" altLang="ko-KR" dirty="0" smtClean="0"/>
+              <a:t>#3</a:t>
             </a:r>
             <a:endParaRPr lang="ko-KR" altLang="en-US" dirty="0"/>
           </a:p>
@@ -2802,6 +2869,365 @@
               <a:rPr lang="ko-KR" altLang="en-US" smtClean="0"/>
               <a:pPr/>
               <a:t>9</a:t>
+            </a:fld>
+            <a:endParaRPr lang="ko-KR" altLang="en-US" dirty="0"/>
+          </a:p>
+        </p:txBody>
+      </p:sp>
+      <p:sp>
+        <p:nvSpPr>
+          <p:cNvPr id="5" name="날짜 개체 틀 4"/>
+          <p:cNvSpPr>
+            <a:spLocks noGrp="1"/>
+          </p:cNvSpPr>
+          <p:nvPr>
+            <p:ph type="dt" sz="half" idx="12"/>
+          </p:nvPr>
+        </p:nvSpPr>
+        <p:spPr/>
+        <p:txBody>
+          <a:bodyPr/>
+          <a:lstStyle/>
+          <a:p>
+            <a:endParaRPr lang="ko-KR" altLang="en-US" dirty="0"/>
+          </a:p>
+        </p:txBody>
+      </p:sp>
+      <p:sp>
+        <p:nvSpPr>
+          <p:cNvPr id="91" name="내용 개체 틀 5"/>
+          <p:cNvSpPr>
+            <a:spLocks noGrp="1"/>
+          </p:cNvSpPr>
+          <p:nvPr>
+            <p:ph sz="quarter" idx="13"/>
+          </p:nvPr>
+        </p:nvSpPr>
+        <p:spPr>
+          <a:xfrm>
+            <a:off x="457200" y="1052736"/>
+            <a:ext cx="8229600" cy="864096"/>
+          </a:xfrm>
+        </p:spPr>
+        <p:txBody>
+          <a:bodyPr>
+            <a:normAutofit fontScale="92500" lnSpcReduction="20000"/>
+          </a:bodyPr>
+          <a:lstStyle/>
+          <a:p>
+            <a:r>
+              <a:rPr lang="ko-KR" altLang="en-US" dirty="0" smtClean="0"/>
+              <a:t>  </a:t>
+            </a:r>
+            <a:r>
+              <a:rPr lang="en-US" altLang="ko-KR" dirty="0" err="1" smtClean="0"/>
+              <a:t>mosquitto</a:t>
+            </a:r>
+            <a:r>
+              <a:rPr lang="en-US" altLang="ko-KR" dirty="0" smtClean="0"/>
+              <a:t> </a:t>
+            </a:r>
+            <a:r>
+              <a:rPr lang="ko-KR" altLang="en-US" dirty="0" smtClean="0"/>
+              <a:t>프로젝트의 </a:t>
+            </a:r>
+            <a:r>
+              <a:rPr lang="ko-KR" altLang="en-US" dirty="0" err="1" smtClean="0"/>
+              <a:t>전처리기</a:t>
+            </a:r>
+            <a:r>
+              <a:rPr lang="ko-KR" altLang="en-US" dirty="0" smtClean="0"/>
+              <a:t> 정의 항목에서 </a:t>
+            </a:r>
+            <a:r>
+              <a:rPr lang="en-US" altLang="ko-KR" dirty="0" smtClean="0"/>
+              <a:t>TLS </a:t>
+            </a:r>
+            <a:r>
+              <a:rPr lang="ko-KR" altLang="en-US" dirty="0" smtClean="0"/>
+              <a:t>지원</a:t>
+            </a:r>
+            <a:r>
+              <a:rPr lang="en-US" altLang="ko-KR" dirty="0" smtClean="0"/>
+              <a:t> </a:t>
+            </a:r>
+            <a:r>
+              <a:rPr lang="ko-KR" altLang="en-US" dirty="0" smtClean="0"/>
+              <a:t>제거</a:t>
+            </a:r>
+            <a:endParaRPr lang="en-US" altLang="ko-KR" dirty="0"/>
+          </a:p>
+          <a:p>
+            <a:pPr lvl="1"/>
+            <a:r>
+              <a:rPr lang="en-US" altLang="ko-KR" dirty="0" smtClean="0"/>
+              <a:t>OpenSSL </a:t>
+            </a:r>
+            <a:r>
+              <a:rPr lang="ko-KR" altLang="en-US" dirty="0" smtClean="0"/>
+              <a:t>버전이 달라서 컴파일이 안 되는 것으로 보임</a:t>
+            </a:r>
+            <a:endParaRPr lang="en-US" altLang="ko-KR" dirty="0" smtClean="0"/>
+          </a:p>
+        </p:txBody>
+      </p:sp>
+      <p:sp>
+        <p:nvSpPr>
+          <p:cNvPr id="22" name="직사각형 21"/>
+          <p:cNvSpPr/>
+          <p:nvPr/>
+        </p:nvSpPr>
+        <p:spPr>
+          <a:xfrm>
+            <a:off x="4499992" y="2564904"/>
+            <a:ext cx="1224136" cy="288031"/>
+          </a:xfrm>
+          <a:prstGeom prst="rect">
+            <a:avLst/>
+          </a:prstGeom>
+          <a:noFill/>
+          <a:ln w="15875">
+            <a:solidFill>
+              <a:srgbClr val="FF0000"/>
+            </a:solidFill>
+            <a:prstDash val="sysDash"/>
+          </a:ln>
+        </p:spPr>
+        <p:style>
+          <a:lnRef idx="2">
+            <a:schemeClr val="accent6"/>
+          </a:lnRef>
+          <a:fillRef idx="1">
+            <a:schemeClr val="lt1"/>
+          </a:fillRef>
+          <a:effectRef idx="0">
+            <a:schemeClr val="accent6"/>
+          </a:effectRef>
+          <a:fontRef idx="minor">
+            <a:schemeClr val="dk1"/>
+          </a:fontRef>
+        </p:style>
+        <p:txBody>
+          <a:bodyPr rtlCol="0" anchor="ctr"/>
+          <a:lstStyle/>
+          <a:p>
+            <a:pPr algn="ctr"/>
+            <a:endParaRPr lang="ko-KR" altLang="en-US"/>
+          </a:p>
+        </p:txBody>
+      </p:sp>
+      <p:sp>
+        <p:nvSpPr>
+          <p:cNvPr id="26" name="직사각형 25"/>
+          <p:cNvSpPr/>
+          <p:nvPr/>
+        </p:nvSpPr>
+        <p:spPr>
+          <a:xfrm>
+            <a:off x="4856265" y="3403044"/>
+            <a:ext cx="2808312" cy="241980"/>
+          </a:xfrm>
+          <a:prstGeom prst="rect">
+            <a:avLst/>
+          </a:prstGeom>
+          <a:solidFill>
+            <a:srgbClr val="FFFF00">
+              <a:alpha val="67000"/>
+            </a:srgbClr>
+          </a:solidFill>
+          <a:ln w="6350">
+            <a:solidFill>
+              <a:schemeClr val="accent1">
+                <a:lumMod val="75000"/>
+              </a:schemeClr>
+            </a:solidFill>
+            <a:prstDash val="dash"/>
+          </a:ln>
+        </p:spPr>
+        <p:style>
+          <a:lnRef idx="2">
+            <a:schemeClr val="accent2">
+              <a:shade val="50000"/>
+            </a:schemeClr>
+          </a:lnRef>
+          <a:fillRef idx="1">
+            <a:schemeClr val="accent2"/>
+          </a:fillRef>
+          <a:effectRef idx="0">
+            <a:schemeClr val="accent2"/>
+          </a:effectRef>
+          <a:fontRef idx="minor">
+            <a:schemeClr val="lt1"/>
+          </a:fontRef>
+        </p:style>
+        <p:txBody>
+          <a:bodyPr wrap="square" lIns="72000" tIns="36000" rIns="36000" bIns="36000" anchor="ctr">
+            <a:spAutoFit/>
+          </a:bodyPr>
+          <a:lstStyle/>
+          <a:p>
+            <a:r>
+              <a:rPr lang="en-US" altLang="ko-KR" sz="1100" b="1" dirty="0" smtClean="0">
+                <a:solidFill>
+                  <a:schemeClr val="tx1"/>
+                </a:solidFill>
+              </a:rPr>
+              <a:t>“WITH_TLS;WITH_TLS_PSK” </a:t>
+            </a:r>
+            <a:r>
+              <a:rPr lang="ko-KR" altLang="en-US" sz="1100" b="1" dirty="0" smtClean="0">
+                <a:solidFill>
+                  <a:schemeClr val="tx1"/>
+                </a:solidFill>
+              </a:rPr>
+              <a:t>제거</a:t>
+            </a:r>
+            <a:endParaRPr lang="en-US" altLang="ko-KR" sz="1100" b="1" dirty="0" smtClean="0">
+              <a:solidFill>
+                <a:schemeClr val="tx1"/>
+              </a:solidFill>
+            </a:endParaRPr>
+          </a:p>
+        </p:txBody>
+      </p:sp>
+      <p:cxnSp>
+        <p:nvCxnSpPr>
+          <p:cNvPr id="27" name="직선 화살표 연결선 26"/>
+          <p:cNvCxnSpPr>
+            <a:stCxn id="26" idx="0"/>
+            <a:endCxn id="22" idx="3"/>
+          </p:cNvCxnSpPr>
+          <p:nvPr/>
+        </p:nvCxnSpPr>
+        <p:spPr>
+          <a:xfrm flipH="1" flipV="1">
+            <a:off x="5724128" y="2708920"/>
+            <a:ext cx="536293" cy="694124"/>
+          </a:xfrm>
+          <a:prstGeom prst="straightConnector1">
+            <a:avLst/>
+          </a:prstGeom>
+          <a:ln w="9525">
+            <a:solidFill>
+              <a:srgbClr val="002060"/>
+            </a:solidFill>
+            <a:prstDash val="dash"/>
+            <a:tailEnd type="diamond"/>
+          </a:ln>
+        </p:spPr>
+        <p:style>
+          <a:lnRef idx="1">
+            <a:schemeClr val="accent1"/>
+          </a:lnRef>
+          <a:fillRef idx="0">
+            <a:schemeClr val="accent1"/>
+          </a:fillRef>
+          <a:effectRef idx="0">
+            <a:schemeClr val="accent1"/>
+          </a:effectRef>
+          <a:fontRef idx="minor">
+            <a:schemeClr val="tx1"/>
+          </a:fontRef>
+        </p:style>
+      </p:cxnSp>
+    </p:spTree>
+    <p:extLst>
+      <p:ext uri="{BB962C8B-B14F-4D97-AF65-F5344CB8AC3E}">
+        <p14:creationId xmlns:p14="http://schemas.microsoft.com/office/powerpoint/2010/main" val="552342770"/>
+      </p:ext>
+    </p:extLst>
+  </p:cSld>
+  <p:clrMapOvr>
+    <a:masterClrMapping/>
+  </p:clrMapOvr>
+  <p:timing>
+    <p:tnLst>
+      <p:par>
+        <p:cTn id="1" dur="indefinite" restart="never" nodeType="tmRoot"/>
+      </p:par>
+    </p:tnLst>
+  </p:timing>
+</p:sld>
+</file>
+
+<file path=ppt/slides/slide11.xml><?xml version="1.0" encoding="utf-8"?>
+<p:sld xmlns:a="http://schemas.openxmlformats.org/drawingml/2006/main" xmlns:r="http://schemas.openxmlformats.org/officeDocument/2006/relationships" xmlns:p="http://schemas.openxmlformats.org/presentationml/2006/main">
+  <p:cSld>
+    <p:spTree>
+      <p:nvGrpSpPr>
+        <p:cNvPr id="1" name=""/>
+        <p:cNvGrpSpPr/>
+        <p:nvPr/>
+      </p:nvGrpSpPr>
+      <p:grpSpPr>
+        <a:xfrm>
+          <a:off x="0" y="0"/>
+          <a:ext cx="0" cy="0"/>
+          <a:chOff x="0" y="0"/>
+          <a:chExt cx="0" cy="0"/>
+        </a:xfrm>
+      </p:grpSpPr>
+      <p:sp>
+        <p:nvSpPr>
+          <p:cNvPr id="2" name="제목 1"/>
+          <p:cNvSpPr>
+            <a:spLocks noGrp="1"/>
+          </p:cNvSpPr>
+          <p:nvPr>
+            <p:ph type="title"/>
+          </p:nvPr>
+        </p:nvSpPr>
+        <p:spPr/>
+        <p:txBody>
+          <a:bodyPr/>
+          <a:lstStyle/>
+          <a:p>
+            <a:r>
+              <a:rPr lang="ko-KR" altLang="en-US" dirty="0" smtClean="0"/>
+              <a:t>실행 환경 설정</a:t>
+            </a:r>
+            <a:endParaRPr lang="ko-KR" altLang="en-US" dirty="0"/>
+          </a:p>
+        </p:txBody>
+      </p:sp>
+      <p:sp>
+        <p:nvSpPr>
+          <p:cNvPr id="3" name="바닥글 개체 틀 2"/>
+          <p:cNvSpPr>
+            <a:spLocks noGrp="1"/>
+          </p:cNvSpPr>
+          <p:nvPr>
+            <p:ph type="ftr" sz="quarter" idx="10"/>
+          </p:nvPr>
+        </p:nvSpPr>
+        <p:spPr/>
+        <p:txBody>
+          <a:bodyPr/>
+          <a:lstStyle/>
+          <a:p>
+            <a:endParaRPr lang="ko-KR" altLang="en-US" dirty="0"/>
+          </a:p>
+        </p:txBody>
+      </p:sp>
+      <p:sp>
+        <p:nvSpPr>
+          <p:cNvPr id="4" name="슬라이드 번호 개체 틀 3"/>
+          <p:cNvSpPr>
+            <a:spLocks noGrp="1"/>
+          </p:cNvSpPr>
+          <p:nvPr>
+            <p:ph type="sldNum" sz="quarter" idx="11"/>
+          </p:nvPr>
+        </p:nvSpPr>
+        <p:spPr/>
+        <p:txBody>
+          <a:bodyPr/>
+          <a:lstStyle/>
+          <a:p>
+            <a:fld id="{D6667735-D60F-427D-9549-94E76B4725B0}" type="slidenum">
+              <a:rPr lang="ko-KR" altLang="en-US" smtClean="0"/>
+              <a:pPr/>
+              <a:t>10</a:t>
             </a:fld>
             <a:endParaRPr lang="ko-KR" altLang="en-US" dirty="0"/>
           </a:p>
@@ -2943,7 +3369,23 @@
             </a:r>
             <a:r>
               <a:rPr lang="ko-KR" altLang="en-US" dirty="0" smtClean="0"/>
-              <a:t>버전 설치</a:t>
+              <a:t>버전 </a:t>
+            </a:r>
+            <a:r>
+              <a:rPr lang="ko-KR" altLang="en-US" dirty="0" smtClean="0"/>
+              <a:t>설치</a:t>
+            </a:r>
+            <a:r>
+              <a:rPr lang="en-US" altLang="ko-KR" dirty="0" smtClean="0"/>
+              <a:t>(SSL </a:t>
+            </a:r>
+            <a:r>
+              <a:rPr lang="ko-KR" altLang="en-US" dirty="0" smtClean="0"/>
+              <a:t>빼고 컴파일 한 경우 생략</a:t>
+            </a:r>
+            <a:r>
+              <a:rPr lang="en-US" altLang="ko-KR" smtClean="0"/>
+              <a:t>)</a:t>
             </a:r>
             <a:endParaRPr lang="en-US" altLang="ko-KR" dirty="0" smtClean="0"/>
           </a:p>
@@ -3840,6 +4282,18 @@
               <a:rPr lang="ko-KR" altLang="en-US" dirty="0" smtClean="0"/>
               <a:t>설치</a:t>
             </a:r>
+            <a:r>
+              <a:rPr lang="en-US" altLang="ko-KR" dirty="0" smtClean="0"/>
+              <a:t>(SSL </a:t>
+            </a:r>
+            <a:r>
+              <a:rPr lang="ko-KR" altLang="en-US" dirty="0" smtClean="0"/>
+              <a:t>사용하지 않는 경우 생략 가능</a:t>
+            </a:r>
+            <a:r>
+              <a:rPr lang="en-US" altLang="ko-KR" dirty="0" smtClean="0"/>
+              <a:t>)</a:t>
+            </a:r>
             <a:endParaRPr lang="ko-KR" altLang="en-US" dirty="0"/>
           </a:p>
         </p:txBody>
@@ -3970,11 +4424,7 @@
             </a:r>
             <a:r>
               <a:rPr lang="ko-KR" altLang="en-US" dirty="0" smtClean="0"/>
-              <a:t>버전이어도 </a:t>
-            </a:r>
-            <a:r>
-              <a:rPr lang="ko-KR" altLang="en-US" dirty="0" smtClean="0"/>
-              <a:t>가능</a:t>
+              <a:t>버전이어도 가능</a:t>
             </a:r>
             <a:endParaRPr lang="en-US" altLang="ko-KR" dirty="0" smtClean="0"/>
           </a:p>
@@ -4108,11 +4558,7 @@
             </a:r>
             <a:r>
               <a:rPr lang="ko-KR" altLang="en-US" dirty="0" smtClean="0"/>
-              <a:t>프로젝트 </a:t>
-            </a:r>
-            <a:r>
-              <a:rPr lang="ko-KR" altLang="en-US" dirty="0" smtClean="0"/>
-              <a:t>생성</a:t>
+              <a:t>프로젝트 생성</a:t>
             </a:r>
             <a:endParaRPr lang="ko-KR" altLang="en-US" dirty="0"/>
           </a:p>
@@ -4744,84 +5190,19 @@
           </a:p>
         </p:txBody>
       </p:sp>
-      <p:sp>
-        <p:nvSpPr>
-          <p:cNvPr id="85" name="직사각형 84"/>
-          <p:cNvSpPr/>
-          <p:nvPr/>
-        </p:nvSpPr>
-        <p:spPr>
-          <a:xfrm>
-            <a:off x="222088" y="2606028"/>
-            <a:ext cx="1512168" cy="241980"/>
-          </a:xfrm>
-          <a:prstGeom prst="rect">
-            <a:avLst/>
-          </a:prstGeom>
-          <a:solidFill>
-            <a:srgbClr val="FFFF00">
-              <a:alpha val="67000"/>
-            </a:srgbClr>
-          </a:solidFill>
-          <a:ln w="6350">
-            <a:solidFill>
-              <a:schemeClr val="accent1">
-                <a:lumMod val="75000"/>
-              </a:schemeClr>
-            </a:solidFill>
-            <a:prstDash val="dash"/>
-          </a:ln>
-        </p:spPr>
-        <p:style>
-          <a:lnRef idx="2">
-            <a:schemeClr val="accent2">
-              <a:shade val="50000"/>
-            </a:schemeClr>
-          </a:lnRef>
-          <a:fillRef idx="1">
-            <a:schemeClr val="accent2"/>
-          </a:fillRef>
-          <a:effectRef idx="0">
-            <a:schemeClr val="accent2"/>
-          </a:effectRef>
-          <a:fontRef idx="minor">
-            <a:schemeClr val="lt1"/>
-          </a:fontRef>
-        </p:style>
-        <p:txBody>
-          <a:bodyPr wrap="square" lIns="72000" tIns="36000" rIns="36000" bIns="36000" anchor="ctr">
-            <a:spAutoFit/>
-          </a:bodyPr>
-          <a:lstStyle/>
-          <a:p>
-            <a:r>
-              <a:rPr lang="ko-KR" altLang="en-US" sz="1100" b="1" dirty="0" smtClean="0">
-                <a:solidFill>
-                  <a:schemeClr val="tx1"/>
-                </a:solidFill>
-              </a:rPr>
-              <a:t>설정 버튼 누름</a:t>
-            </a:r>
-            <a:endParaRPr lang="en-US" altLang="ko-KR" sz="1100" b="1" dirty="0" smtClean="0">
-              <a:solidFill>
-                <a:schemeClr val="tx1"/>
-              </a:solidFill>
-            </a:endParaRPr>
-          </a:p>
-        </p:txBody>
-      </p:sp>
       <p:cxnSp>
         <p:nvCxnSpPr>
           <p:cNvPr id="86" name="직선 화살표 연결선 85"/>
           <p:cNvCxnSpPr>
             <a:stCxn id="85" idx="2"/>
+            <a:endCxn id="80" idx="0"/>
           </p:cNvCxnSpPr>
           <p:nvPr/>
         </p:nvCxnSpPr>
         <p:spPr>
-          <a:xfrm>
-            <a:off x="978172" y="2848008"/>
-            <a:ext cx="193394" cy="1021024"/>
+          <a:xfrm flipH="1">
+            <a:off x="1171566" y="2814913"/>
+            <a:ext cx="585013" cy="1054119"/>
           </a:xfrm>
           <a:prstGeom prst="straightConnector1">
             <a:avLst/>
@@ -5297,6 +5678,104 @@
           </a:fontRef>
         </p:style>
       </p:cxnSp>
+      <p:sp>
+        <p:nvSpPr>
+          <p:cNvPr id="85" name="직사각형 84"/>
+          <p:cNvSpPr/>
+          <p:nvPr/>
+        </p:nvSpPr>
+        <p:spPr>
+          <a:xfrm>
+            <a:off x="582242" y="2403656"/>
+            <a:ext cx="2348674" cy="411257"/>
+          </a:xfrm>
+          <a:prstGeom prst="rect">
+            <a:avLst/>
+          </a:prstGeom>
+          <a:solidFill>
+            <a:srgbClr val="FFFF00">
+              <a:alpha val="67000"/>
+            </a:srgbClr>
+          </a:solidFill>
+          <a:ln w="6350">
+            <a:solidFill>
+              <a:schemeClr val="accent1">
+                <a:lumMod val="75000"/>
+              </a:schemeClr>
+            </a:solidFill>
+            <a:prstDash val="dash"/>
+          </a:ln>
+        </p:spPr>
+        <p:style>
+          <a:lnRef idx="2">
+            <a:schemeClr val="accent2">
+              <a:shade val="50000"/>
+            </a:schemeClr>
+          </a:lnRef>
+          <a:fillRef idx="1">
+            <a:schemeClr val="accent2"/>
+          </a:fillRef>
+          <a:effectRef idx="0">
+            <a:schemeClr val="accent2"/>
+          </a:effectRef>
+          <a:fontRef idx="minor">
+            <a:schemeClr val="lt1"/>
+          </a:fontRef>
+        </p:style>
+        <p:txBody>
+          <a:bodyPr wrap="square" lIns="72000" tIns="36000" rIns="36000" bIns="36000" anchor="ctr">
+            <a:spAutoFit/>
+          </a:bodyPr>
+          <a:lstStyle/>
+          <a:p>
+            <a:r>
+              <a:rPr lang="ko-KR" altLang="en-US" sz="1100" b="1" dirty="0" err="1" smtClean="0">
+                <a:solidFill>
+                  <a:schemeClr val="tx1"/>
+                </a:solidFill>
+              </a:rPr>
+              <a:t>설정전</a:t>
+            </a:r>
+            <a:r>
+              <a:rPr lang="ko-KR" altLang="en-US" sz="1100" b="1" dirty="0" smtClean="0">
+                <a:solidFill>
+                  <a:schemeClr val="tx1"/>
+                </a:solidFill>
+              </a:rPr>
+              <a:t> </a:t>
+            </a:r>
+            <a:r>
+              <a:rPr lang="en-US" altLang="ko-KR" sz="1100" b="1" dirty="0" smtClean="0">
+                <a:solidFill>
+                  <a:schemeClr val="tx1"/>
+                </a:solidFill>
+              </a:rPr>
+              <a:t>“</a:t>
+            </a:r>
+            <a:r>
+              <a:rPr lang="en-US" altLang="ko-KR" sz="1100" b="1" dirty="0" smtClean="0">
+                <a:solidFill>
+                  <a:schemeClr val="tx1"/>
+                </a:solidFill>
+              </a:rPr>
+              <a:t>LWS_WITH_SSL” </a:t>
+            </a:r>
+            <a:r>
+              <a:rPr lang="ko-KR" altLang="en-US" sz="1100" b="1" dirty="0" smtClean="0">
+                <a:solidFill>
+                  <a:schemeClr val="tx1"/>
+                </a:solidFill>
+              </a:rPr>
+              <a:t>체크를 뺌</a:t>
+            </a:r>
+            <a:endParaRPr lang="en-US" altLang="ko-KR" sz="1100" b="1" dirty="0" smtClean="0">
+              <a:solidFill>
+                <a:schemeClr val="tx1"/>
+              </a:solidFill>
+            </a:endParaRPr>
+          </a:p>
+        </p:txBody>
+      </p:sp>
     </p:spTree>
     <p:extLst>
       <p:ext uri="{BB962C8B-B14F-4D97-AF65-F5344CB8AC3E}">
@@ -5318,6 +5797,937 @@
 </file>
 
 <file path=ppt/slides/slide6.xml><?xml version="1.0" encoding="utf-8"?>
+<p:sld xmlns:a="http://schemas.openxmlformats.org/drawingml/2006/main" xmlns:r="http://schemas.openxmlformats.org/officeDocument/2006/relationships" xmlns:p="http://schemas.openxmlformats.org/presentationml/2006/main">
+  <p:cSld>
+    <p:spTree>
+      <p:nvGrpSpPr>
+        <p:cNvPr id="1" name=""/>
+        <p:cNvGrpSpPr/>
+        <p:nvPr/>
+      </p:nvGrpSpPr>
+      <p:grpSpPr>
+        <a:xfrm>
+          <a:off x="0" y="0"/>
+          <a:ext cx="0" cy="0"/>
+          <a:chOff x="0" y="0"/>
+          <a:chExt cx="0" cy="0"/>
+        </a:xfrm>
+      </p:grpSpPr>
+      <p:pic>
+        <p:nvPicPr>
+          <p:cNvPr id="1027" name="Picture 3"/>
+          <p:cNvPicPr>
+            <a:picLocks noChangeAspect="1" noChangeArrowheads="1"/>
+          </p:cNvPicPr>
+          <p:nvPr/>
+        </p:nvPicPr>
+        <p:blipFill>
+          <a:blip r:embed="rId2">
+            <a:extLst>
+              <a:ext uri="{28A0092B-C50C-407E-A947-70E740481C1C}">
+                <a14:useLocalDpi xmlns:a14="http://schemas.microsoft.com/office/drawing/2010/main" val="0"/>
+              </a:ext>
+            </a:extLst>
+          </a:blip>
+          <a:srcRect/>
+          <a:stretch>
+            <a:fillRect/>
+          </a:stretch>
+        </p:blipFill>
+        <p:spPr bwMode="auto">
+          <a:xfrm>
+            <a:off x="202646" y="2482901"/>
+            <a:ext cx="8791575" cy="2971800"/>
+          </a:xfrm>
+          <a:prstGeom prst="rect">
+            <a:avLst/>
+          </a:prstGeom>
+          <a:noFill/>
+          <a:ln>
+            <a:noFill/>
+          </a:ln>
+          <a:extLst>
+            <a:ext uri="{909E8E84-426E-40DD-AFC4-6F175D3DCCD1}">
+              <a14:hiddenFill xmlns:a14="http://schemas.microsoft.com/office/drawing/2010/main">
+                <a:solidFill>
+                  <a:schemeClr val="accent1"/>
+                </a:solidFill>
+              </a14:hiddenFill>
+            </a:ext>
+            <a:ext uri="{91240B29-F687-4F45-9708-019B960494DF}">
+              <a14:hiddenLine xmlns:a14="http://schemas.microsoft.com/office/drawing/2010/main" w="9525">
+                <a:solidFill>
+                  <a:schemeClr val="tx1"/>
+                </a:solidFill>
+                <a:miter lim="800000"/>
+                <a:headEnd/>
+                <a:tailEnd/>
+              </a14:hiddenLine>
+            </a:ext>
+          </a:extLst>
+        </p:spPr>
+      </p:pic>
+      <p:sp>
+        <p:nvSpPr>
+          <p:cNvPr id="2" name="제목 1"/>
+          <p:cNvSpPr>
+            <a:spLocks noGrp="1"/>
+          </p:cNvSpPr>
+          <p:nvPr>
+            <p:ph type="title"/>
+          </p:nvPr>
+        </p:nvSpPr>
+        <p:spPr/>
+        <p:txBody>
+          <a:bodyPr/>
+          <a:lstStyle/>
+          <a:p>
+            <a:r>
+              <a:rPr lang="en-US" altLang="ko-KR" dirty="0" err="1"/>
+              <a:t>libwebsockets</a:t>
+            </a:r>
+            <a:r>
+              <a:rPr lang="en-US" altLang="ko-KR" dirty="0"/>
+              <a:t> </a:t>
+            </a:r>
+            <a:r>
+              <a:rPr lang="ko-KR" altLang="en-US" dirty="0" smtClean="0"/>
+              <a:t>컴파</a:t>
+            </a:r>
+            <a:r>
+              <a:rPr lang="ko-KR" altLang="en-US" dirty="0"/>
+              <a:t>일</a:t>
+            </a:r>
+            <a:endParaRPr lang="ko-KR" altLang="en-US" dirty="0"/>
+          </a:p>
+        </p:txBody>
+      </p:sp>
+      <p:sp>
+        <p:nvSpPr>
+          <p:cNvPr id="3" name="바닥글 개체 틀 2"/>
+          <p:cNvSpPr>
+            <a:spLocks noGrp="1"/>
+          </p:cNvSpPr>
+          <p:nvPr>
+            <p:ph type="ftr" sz="quarter" idx="10"/>
+          </p:nvPr>
+        </p:nvSpPr>
+        <p:spPr/>
+        <p:txBody>
+          <a:bodyPr/>
+          <a:lstStyle/>
+          <a:p>
+            <a:endParaRPr lang="ko-KR" altLang="en-US" dirty="0"/>
+          </a:p>
+        </p:txBody>
+      </p:sp>
+      <p:sp>
+        <p:nvSpPr>
+          <p:cNvPr id="4" name="슬라이드 번호 개체 틀 3"/>
+          <p:cNvSpPr>
+            <a:spLocks noGrp="1"/>
+          </p:cNvSpPr>
+          <p:nvPr>
+            <p:ph type="sldNum" sz="quarter" idx="11"/>
+          </p:nvPr>
+        </p:nvSpPr>
+        <p:spPr/>
+        <p:txBody>
+          <a:bodyPr/>
+          <a:lstStyle/>
+          <a:p>
+            <a:fld id="{D6667735-D60F-427D-9549-94E76B4725B0}" type="slidenum">
+              <a:rPr lang="ko-KR" altLang="en-US" smtClean="0"/>
+              <a:pPr/>
+              <a:t>5</a:t>
+            </a:fld>
+            <a:endParaRPr lang="ko-KR" altLang="en-US" dirty="0"/>
+          </a:p>
+        </p:txBody>
+      </p:sp>
+      <p:sp>
+        <p:nvSpPr>
+          <p:cNvPr id="5" name="날짜 개체 틀 4"/>
+          <p:cNvSpPr>
+            <a:spLocks noGrp="1"/>
+          </p:cNvSpPr>
+          <p:nvPr>
+            <p:ph type="dt" sz="half" idx="12"/>
+          </p:nvPr>
+        </p:nvSpPr>
+        <p:spPr/>
+        <p:txBody>
+          <a:bodyPr/>
+          <a:lstStyle/>
+          <a:p>
+            <a:endParaRPr lang="ko-KR" altLang="en-US" dirty="0"/>
+          </a:p>
+        </p:txBody>
+      </p:sp>
+      <p:sp>
+        <p:nvSpPr>
+          <p:cNvPr id="85" name="직사각형 84"/>
+          <p:cNvSpPr/>
+          <p:nvPr/>
+        </p:nvSpPr>
+        <p:spPr>
+          <a:xfrm>
+            <a:off x="788528" y="2121929"/>
+            <a:ext cx="1512168" cy="241980"/>
+          </a:xfrm>
+          <a:prstGeom prst="rect">
+            <a:avLst/>
+          </a:prstGeom>
+          <a:solidFill>
+            <a:srgbClr val="FFFF00">
+              <a:alpha val="67000"/>
+            </a:srgbClr>
+          </a:solidFill>
+          <a:ln w="6350">
+            <a:solidFill>
+              <a:schemeClr val="accent1">
+                <a:lumMod val="75000"/>
+              </a:schemeClr>
+            </a:solidFill>
+            <a:prstDash val="dash"/>
+          </a:ln>
+        </p:spPr>
+        <p:style>
+          <a:lnRef idx="2">
+            <a:schemeClr val="accent2">
+              <a:shade val="50000"/>
+            </a:schemeClr>
+          </a:lnRef>
+          <a:fillRef idx="1">
+            <a:schemeClr val="accent2"/>
+          </a:fillRef>
+          <a:effectRef idx="0">
+            <a:schemeClr val="accent2"/>
+          </a:effectRef>
+          <a:fontRef idx="minor">
+            <a:schemeClr val="lt1"/>
+          </a:fontRef>
+        </p:style>
+        <p:txBody>
+          <a:bodyPr wrap="square" lIns="72000" tIns="36000" rIns="36000" bIns="36000" anchor="ctr">
+            <a:spAutoFit/>
+          </a:bodyPr>
+          <a:lstStyle/>
+          <a:p>
+            <a:r>
+              <a:rPr lang="en-US" altLang="ko-KR" sz="1100" b="1" dirty="0" smtClean="0">
+                <a:solidFill>
+                  <a:schemeClr val="tx1"/>
+                </a:solidFill>
+              </a:rPr>
+              <a:t>Release </a:t>
+            </a:r>
+            <a:r>
+              <a:rPr lang="ko-KR" altLang="en-US" sz="1100" b="1" dirty="0" err="1" smtClean="0">
+                <a:solidFill>
+                  <a:schemeClr val="tx1"/>
+                </a:solidFill>
+              </a:rPr>
+              <a:t>빌드</a:t>
+            </a:r>
+            <a:r>
+              <a:rPr lang="ko-KR" altLang="en-US" sz="1100" b="1" dirty="0" smtClean="0">
+                <a:solidFill>
+                  <a:schemeClr val="tx1"/>
+                </a:solidFill>
+              </a:rPr>
+              <a:t> </a:t>
+            </a:r>
+            <a:r>
+              <a:rPr lang="ko-KR" altLang="en-US" sz="1100" b="1" dirty="0" smtClean="0">
+                <a:solidFill>
+                  <a:schemeClr val="tx1"/>
+                </a:solidFill>
+              </a:rPr>
+              <a:t>선택</a:t>
+            </a:r>
+            <a:endParaRPr lang="en-US" altLang="ko-KR" sz="1100" b="1" dirty="0" smtClean="0">
+              <a:solidFill>
+                <a:schemeClr val="tx1"/>
+              </a:solidFill>
+            </a:endParaRPr>
+          </a:p>
+        </p:txBody>
+      </p:sp>
+      <p:cxnSp>
+        <p:nvCxnSpPr>
+          <p:cNvPr id="86" name="직선 화살표 연결선 85"/>
+          <p:cNvCxnSpPr>
+            <a:stCxn id="85" idx="2"/>
+            <a:endCxn id="80" idx="0"/>
+          </p:cNvCxnSpPr>
+          <p:nvPr/>
+        </p:nvCxnSpPr>
+        <p:spPr>
+          <a:xfrm>
+            <a:off x="1544612" y="2363909"/>
+            <a:ext cx="713172" cy="417019"/>
+          </a:xfrm>
+          <a:prstGeom prst="straightConnector1">
+            <a:avLst/>
+          </a:prstGeom>
+          <a:ln w="9525">
+            <a:solidFill>
+              <a:srgbClr val="002060"/>
+            </a:solidFill>
+            <a:prstDash val="dash"/>
+            <a:tailEnd type="diamond"/>
+          </a:ln>
+        </p:spPr>
+        <p:style>
+          <a:lnRef idx="1">
+            <a:schemeClr val="accent1"/>
+          </a:lnRef>
+          <a:fillRef idx="0">
+            <a:schemeClr val="accent1"/>
+          </a:fillRef>
+          <a:effectRef idx="0">
+            <a:schemeClr val="accent1"/>
+          </a:effectRef>
+          <a:fontRef idx="minor">
+            <a:schemeClr val="tx1"/>
+          </a:fontRef>
+        </p:style>
+      </p:cxnSp>
+      <p:sp>
+        <p:nvSpPr>
+          <p:cNvPr id="91" name="내용 개체 틀 5"/>
+          <p:cNvSpPr>
+            <a:spLocks noGrp="1"/>
+          </p:cNvSpPr>
+          <p:nvPr>
+            <p:ph sz="quarter" idx="13"/>
+          </p:nvPr>
+        </p:nvSpPr>
+        <p:spPr>
+          <a:xfrm>
+            <a:off x="457200" y="1052736"/>
+            <a:ext cx="8229600" cy="864096"/>
+          </a:xfrm>
+        </p:spPr>
+        <p:txBody>
+          <a:bodyPr>
+            <a:normAutofit fontScale="85000" lnSpcReduction="20000"/>
+          </a:bodyPr>
+          <a:lstStyle/>
+          <a:p>
+            <a:r>
+              <a:rPr lang="ko-KR" altLang="en-US" dirty="0" err="1" smtClean="0"/>
+              <a:t>빌드후</a:t>
+            </a:r>
+            <a:r>
+              <a:rPr lang="ko-KR" altLang="en-US" dirty="0" smtClean="0"/>
+              <a:t> 생성 파일</a:t>
+            </a:r>
+            <a:r>
+              <a:rPr lang="en-US" altLang="ko-KR" dirty="0"/>
+              <a:t/>
+            </a:r>
+            <a:br>
+              <a:rPr lang="en-US" altLang="ko-KR" dirty="0"/>
+            </a:br>
+            <a:r>
+              <a:rPr lang="en-US" altLang="ko-KR" dirty="0" smtClean="0"/>
+              <a:t>libwebsockets-2.3.0\build\bin\Release\websockets.dll</a:t>
+            </a:r>
+            <a:r>
+              <a:rPr lang="ko-KR" altLang="en-US" dirty="0"/>
+              <a:t> </a:t>
+            </a:r>
+            <a:r>
+              <a:rPr lang="ko-KR" altLang="en-US" dirty="0" smtClean="0"/>
+              <a:t>파일 사용</a:t>
+            </a:r>
+            <a:endParaRPr lang="en-US" altLang="ko-KR" dirty="0" smtClean="0"/>
+          </a:p>
+        </p:txBody>
+      </p:sp>
+      <p:sp>
+        <p:nvSpPr>
+          <p:cNvPr id="8" name="직사각형 7"/>
+          <p:cNvSpPr/>
+          <p:nvPr/>
+        </p:nvSpPr>
+        <p:spPr>
+          <a:xfrm>
+            <a:off x="2385295" y="2780928"/>
+            <a:ext cx="1842381" cy="254101"/>
+          </a:xfrm>
+          <a:prstGeom prst="rect">
+            <a:avLst/>
+          </a:prstGeom>
+          <a:noFill/>
+          <a:ln w="15875">
+            <a:solidFill>
+              <a:srgbClr val="FF0000"/>
+            </a:solidFill>
+            <a:prstDash val="sysDash"/>
+          </a:ln>
+        </p:spPr>
+        <p:style>
+          <a:lnRef idx="2">
+            <a:schemeClr val="accent6"/>
+          </a:lnRef>
+          <a:fillRef idx="1">
+            <a:schemeClr val="lt1"/>
+          </a:fillRef>
+          <a:effectRef idx="0">
+            <a:schemeClr val="accent6"/>
+          </a:effectRef>
+          <a:fontRef idx="minor">
+            <a:schemeClr val="dk1"/>
+          </a:fontRef>
+        </p:style>
+        <p:txBody>
+          <a:bodyPr rtlCol="0" anchor="ctr"/>
+          <a:lstStyle/>
+          <a:p>
+            <a:pPr algn="ctr"/>
+            <a:endParaRPr lang="ko-KR" altLang="en-US"/>
+          </a:p>
+        </p:txBody>
+      </p:sp>
+      <p:sp>
+        <p:nvSpPr>
+          <p:cNvPr id="24" name="직사각형 23"/>
+          <p:cNvSpPr/>
+          <p:nvPr/>
+        </p:nvSpPr>
+        <p:spPr>
+          <a:xfrm>
+            <a:off x="5593112" y="2513687"/>
+            <a:ext cx="1512168" cy="411257"/>
+          </a:xfrm>
+          <a:prstGeom prst="rect">
+            <a:avLst/>
+          </a:prstGeom>
+          <a:solidFill>
+            <a:srgbClr val="FFFF00">
+              <a:alpha val="67000"/>
+            </a:srgbClr>
+          </a:solidFill>
+          <a:ln w="6350">
+            <a:solidFill>
+              <a:schemeClr val="accent1">
+                <a:lumMod val="75000"/>
+              </a:schemeClr>
+            </a:solidFill>
+            <a:prstDash val="dash"/>
+          </a:ln>
+        </p:spPr>
+        <p:style>
+          <a:lnRef idx="2">
+            <a:schemeClr val="accent2">
+              <a:shade val="50000"/>
+            </a:schemeClr>
+          </a:lnRef>
+          <a:fillRef idx="1">
+            <a:schemeClr val="accent2"/>
+          </a:fillRef>
+          <a:effectRef idx="0">
+            <a:schemeClr val="accent2"/>
+          </a:effectRef>
+          <a:fontRef idx="minor">
+            <a:schemeClr val="lt1"/>
+          </a:fontRef>
+        </p:style>
+        <p:txBody>
+          <a:bodyPr wrap="square" lIns="72000" tIns="36000" rIns="36000" bIns="36000" anchor="ctr">
+            <a:spAutoFit/>
+          </a:bodyPr>
+          <a:lstStyle/>
+          <a:p>
+            <a:r>
+              <a:rPr lang="en-US" altLang="ko-KR" sz="1100" b="1" dirty="0" smtClean="0">
+                <a:solidFill>
+                  <a:schemeClr val="tx1"/>
+                </a:solidFill>
+              </a:rPr>
+              <a:t>ALL_BUILD </a:t>
+            </a:r>
+            <a:r>
+              <a:rPr lang="ko-KR" altLang="en-US" sz="1100" b="1" dirty="0" err="1" smtClean="0">
+                <a:solidFill>
+                  <a:schemeClr val="tx1"/>
+                </a:solidFill>
+              </a:rPr>
+              <a:t>선택후</a:t>
+            </a:r>
+            <a:r>
+              <a:rPr lang="ko-KR" altLang="en-US" sz="1100" b="1" dirty="0" smtClean="0">
+                <a:solidFill>
+                  <a:schemeClr val="tx1"/>
+                </a:solidFill>
+              </a:rPr>
+              <a:t> </a:t>
+            </a:r>
+            <a:r>
+              <a:rPr lang="ko-KR" altLang="en-US" sz="1100" b="1" dirty="0" err="1" smtClean="0">
+                <a:solidFill>
+                  <a:schemeClr val="tx1"/>
+                </a:solidFill>
+              </a:rPr>
+              <a:t>빌드</a:t>
+            </a:r>
+            <a:endParaRPr lang="en-US" altLang="ko-KR" sz="1100" b="1" dirty="0" smtClean="0">
+              <a:solidFill>
+                <a:schemeClr val="tx1"/>
+              </a:solidFill>
+            </a:endParaRPr>
+          </a:p>
+        </p:txBody>
+      </p:sp>
+      <p:cxnSp>
+        <p:nvCxnSpPr>
+          <p:cNvPr id="25" name="직선 화살표 연결선 24"/>
+          <p:cNvCxnSpPr>
+            <a:stCxn id="24" idx="2"/>
+            <a:endCxn id="23" idx="0"/>
+          </p:cNvCxnSpPr>
+          <p:nvPr/>
+        </p:nvCxnSpPr>
+        <p:spPr>
+          <a:xfrm flipH="1">
+            <a:off x="6270365" y="2924944"/>
+            <a:ext cx="78831" cy="1006465"/>
+          </a:xfrm>
+          <a:prstGeom prst="straightConnector1">
+            <a:avLst/>
+          </a:prstGeom>
+          <a:ln w="9525">
+            <a:solidFill>
+              <a:srgbClr val="002060"/>
+            </a:solidFill>
+            <a:prstDash val="dash"/>
+            <a:tailEnd type="diamond"/>
+          </a:ln>
+        </p:spPr>
+        <p:style>
+          <a:lnRef idx="1">
+            <a:schemeClr val="accent1"/>
+          </a:lnRef>
+          <a:fillRef idx="0">
+            <a:schemeClr val="accent1"/>
+          </a:fillRef>
+          <a:effectRef idx="0">
+            <a:schemeClr val="accent1"/>
+          </a:effectRef>
+          <a:fontRef idx="minor">
+            <a:schemeClr val="tx1"/>
+          </a:fontRef>
+        </p:style>
+      </p:cxnSp>
+      <p:sp>
+        <p:nvSpPr>
+          <p:cNvPr id="80" name="타원 79"/>
+          <p:cNvSpPr/>
+          <p:nvPr/>
+        </p:nvSpPr>
+        <p:spPr>
+          <a:xfrm>
+            <a:off x="2113768" y="2780928"/>
+            <a:ext cx="288032" cy="288032"/>
+          </a:xfrm>
+          <a:prstGeom prst="ellipse">
+            <a:avLst/>
+          </a:prstGeom>
+          <a:solidFill>
+            <a:srgbClr val="00B0F0"/>
+          </a:solidFill>
+          <a:ln w="25400" cap="flat" cmpd="sng" algn="ctr">
+            <a:noFill/>
+            <a:prstDash val="solid"/>
+          </a:ln>
+          <a:effectLst/>
+        </p:spPr>
+        <p:txBody>
+          <a:bodyPr lIns="18000" rIns="18000" rtlCol="0" anchor="ctr"/>
+          <a:lstStyle>
+            <a:defPPr>
+              <a:defRPr lang="ko-KR"/>
+            </a:defPPr>
+            <a:lvl1pPr marL="0" algn="l" defTabSz="914400" rtl="0" eaLnBrk="1" latinLnBrk="1" hangingPunct="1">
+              <a:defRPr sz="1800" kern="1200">
+                <a:solidFill>
+                  <a:schemeClr val="tx1"/>
+                </a:solidFill>
+                <a:latin typeface="+mn-lt"/>
+                <a:ea typeface="+mn-ea"/>
+                <a:cs typeface="+mn-cs"/>
+              </a:defRPr>
+            </a:lvl1pPr>
+            <a:lvl2pPr marL="457200" algn="l" defTabSz="914400" rtl="0" eaLnBrk="1" latinLnBrk="1" hangingPunct="1">
+              <a:defRPr sz="1800" kern="1200">
+                <a:solidFill>
+                  <a:schemeClr val="tx1"/>
+                </a:solidFill>
+                <a:latin typeface="+mn-lt"/>
+                <a:ea typeface="+mn-ea"/>
+                <a:cs typeface="+mn-cs"/>
+              </a:defRPr>
+            </a:lvl2pPr>
+            <a:lvl3pPr marL="914400" algn="l" defTabSz="914400" rtl="0" eaLnBrk="1" latinLnBrk="1" hangingPunct="1">
+              <a:defRPr sz="1800" kern="1200">
+                <a:solidFill>
+                  <a:schemeClr val="tx1"/>
+                </a:solidFill>
+                <a:latin typeface="+mn-lt"/>
+                <a:ea typeface="+mn-ea"/>
+                <a:cs typeface="+mn-cs"/>
+              </a:defRPr>
+            </a:lvl3pPr>
+            <a:lvl4pPr marL="1371600" algn="l" defTabSz="914400" rtl="0" eaLnBrk="1" latinLnBrk="1" hangingPunct="1">
+              <a:defRPr sz="1800" kern="1200">
+                <a:solidFill>
+                  <a:schemeClr val="tx1"/>
+                </a:solidFill>
+                <a:latin typeface="+mn-lt"/>
+                <a:ea typeface="+mn-ea"/>
+                <a:cs typeface="+mn-cs"/>
+              </a:defRPr>
+            </a:lvl4pPr>
+            <a:lvl5pPr marL="1828800" algn="l" defTabSz="914400" rtl="0" eaLnBrk="1" latinLnBrk="1" hangingPunct="1">
+              <a:defRPr sz="1800" kern="1200">
+                <a:solidFill>
+                  <a:schemeClr val="tx1"/>
+                </a:solidFill>
+                <a:latin typeface="+mn-lt"/>
+                <a:ea typeface="+mn-ea"/>
+                <a:cs typeface="+mn-cs"/>
+              </a:defRPr>
+            </a:lvl5pPr>
+            <a:lvl6pPr marL="2286000" algn="l" defTabSz="914400" rtl="0" eaLnBrk="1" latinLnBrk="1" hangingPunct="1">
+              <a:defRPr sz="1800" kern="1200">
+                <a:solidFill>
+                  <a:schemeClr val="tx1"/>
+                </a:solidFill>
+                <a:latin typeface="+mn-lt"/>
+                <a:ea typeface="+mn-ea"/>
+                <a:cs typeface="+mn-cs"/>
+              </a:defRPr>
+            </a:lvl6pPr>
+            <a:lvl7pPr marL="2743200" algn="l" defTabSz="914400" rtl="0" eaLnBrk="1" latinLnBrk="1" hangingPunct="1">
+              <a:defRPr sz="1800" kern="1200">
+                <a:solidFill>
+                  <a:schemeClr val="tx1"/>
+                </a:solidFill>
+                <a:latin typeface="+mn-lt"/>
+                <a:ea typeface="+mn-ea"/>
+                <a:cs typeface="+mn-cs"/>
+              </a:defRPr>
+            </a:lvl7pPr>
+            <a:lvl8pPr marL="3200400" algn="l" defTabSz="914400" rtl="0" eaLnBrk="1" latinLnBrk="1" hangingPunct="1">
+              <a:defRPr sz="1800" kern="1200">
+                <a:solidFill>
+                  <a:schemeClr val="tx1"/>
+                </a:solidFill>
+                <a:latin typeface="+mn-lt"/>
+                <a:ea typeface="+mn-ea"/>
+                <a:cs typeface="+mn-cs"/>
+              </a:defRPr>
+            </a:lvl8pPr>
+            <a:lvl9pPr marL="3657600" algn="l" defTabSz="914400" rtl="0" eaLnBrk="1" latinLnBrk="1" hangingPunct="1">
+              <a:defRPr sz="1800" kern="1200">
+                <a:solidFill>
+                  <a:schemeClr val="tx1"/>
+                </a:solidFill>
+                <a:latin typeface="+mn-lt"/>
+                <a:ea typeface="+mn-ea"/>
+                <a:cs typeface="+mn-cs"/>
+              </a:defRPr>
+            </a:lvl9pPr>
+          </a:lstStyle>
+          <a:p>
+            <a:pPr marL="0" marR="0" lvl="0" indent="0" algn="ctr" defTabSz="914400" rtl="0" eaLnBrk="1" fontAlgn="base" latinLnBrk="1" hangingPunct="1">
+              <a:lnSpc>
+                <a:spcPct val="100000"/>
+              </a:lnSpc>
+              <a:spcBef>
+                <a:spcPct val="0"/>
+              </a:spcBef>
+              <a:spcAft>
+                <a:spcPct val="0"/>
+              </a:spcAft>
+              <a:buClrTx/>
+              <a:buSzTx/>
+              <a:buFontTx/>
+              <a:buNone/>
+              <a:tabLst/>
+              <a:defRPr/>
+            </a:pPr>
+            <a:r>
+              <a:rPr kumimoji="1" lang="en-US" altLang="ko-KR" sz="1000" b="0" i="0" u="none" strike="noStrike" kern="1200" cap="none" spc="0" normalizeH="0" baseline="0" noProof="0" smtClean="0">
+                <a:ln>
+                  <a:noFill/>
+                </a:ln>
+                <a:solidFill>
+                  <a:prstClr val="white"/>
+                </a:solidFill>
+                <a:effectLst/>
+                <a:uLnTx/>
+                <a:uFillTx/>
+                <a:latin typeface="Arial"/>
+                <a:ea typeface="HY견고딕"/>
+              </a:rPr>
+              <a:t>1</a:t>
+            </a:r>
+            <a:endParaRPr kumimoji="1" lang="ko-KR" altLang="en-US" sz="1000" b="0" i="0" u="none" strike="noStrike" kern="1200" cap="none" spc="0" normalizeH="0" baseline="0" noProof="0" dirty="0">
+              <a:ln>
+                <a:noFill/>
+              </a:ln>
+              <a:solidFill>
+                <a:prstClr val="white"/>
+              </a:solidFill>
+              <a:effectLst/>
+              <a:uLnTx/>
+              <a:uFillTx/>
+              <a:latin typeface="Arial"/>
+              <a:ea typeface="HY견고딕"/>
+            </a:endParaRPr>
+          </a:p>
+        </p:txBody>
+      </p:sp>
+      <p:sp>
+        <p:nvSpPr>
+          <p:cNvPr id="26" name="직사각형 25"/>
+          <p:cNvSpPr/>
+          <p:nvPr/>
+        </p:nvSpPr>
+        <p:spPr>
+          <a:xfrm>
+            <a:off x="4427984" y="3965340"/>
+            <a:ext cx="1842381" cy="254101"/>
+          </a:xfrm>
+          <a:prstGeom prst="rect">
+            <a:avLst/>
+          </a:prstGeom>
+          <a:noFill/>
+          <a:ln w="15875">
+            <a:solidFill>
+              <a:srgbClr val="FF0000"/>
+            </a:solidFill>
+            <a:prstDash val="sysDash"/>
+          </a:ln>
+        </p:spPr>
+        <p:style>
+          <a:lnRef idx="2">
+            <a:schemeClr val="accent6"/>
+          </a:lnRef>
+          <a:fillRef idx="1">
+            <a:schemeClr val="lt1"/>
+          </a:fillRef>
+          <a:effectRef idx="0">
+            <a:schemeClr val="accent6"/>
+          </a:effectRef>
+          <a:fontRef idx="minor">
+            <a:schemeClr val="dk1"/>
+          </a:fontRef>
+        </p:style>
+        <p:txBody>
+          <a:bodyPr rtlCol="0" anchor="ctr"/>
+          <a:lstStyle/>
+          <a:p>
+            <a:pPr algn="ctr"/>
+            <a:endParaRPr lang="ko-KR" altLang="en-US"/>
+          </a:p>
+        </p:txBody>
+      </p:sp>
+      <p:sp>
+        <p:nvSpPr>
+          <p:cNvPr id="23" name="타원 22"/>
+          <p:cNvSpPr/>
+          <p:nvPr/>
+        </p:nvSpPr>
+        <p:spPr>
+          <a:xfrm>
+            <a:off x="6126349" y="3931409"/>
+            <a:ext cx="288032" cy="288032"/>
+          </a:xfrm>
+          <a:prstGeom prst="ellipse">
+            <a:avLst/>
+          </a:prstGeom>
+          <a:solidFill>
+            <a:srgbClr val="00B0F0"/>
+          </a:solidFill>
+          <a:ln w="25400" cap="flat" cmpd="sng" algn="ctr">
+            <a:noFill/>
+            <a:prstDash val="solid"/>
+          </a:ln>
+          <a:effectLst/>
+        </p:spPr>
+        <p:txBody>
+          <a:bodyPr lIns="18000" rIns="18000" rtlCol="0" anchor="ctr"/>
+          <a:lstStyle>
+            <a:defPPr>
+              <a:defRPr lang="ko-KR"/>
+            </a:defPPr>
+            <a:lvl1pPr marL="0" algn="l" defTabSz="914400" rtl="0" eaLnBrk="1" latinLnBrk="1" hangingPunct="1">
+              <a:defRPr sz="1800" kern="1200">
+                <a:solidFill>
+                  <a:schemeClr val="tx1"/>
+                </a:solidFill>
+                <a:latin typeface="+mn-lt"/>
+                <a:ea typeface="+mn-ea"/>
+                <a:cs typeface="+mn-cs"/>
+              </a:defRPr>
+            </a:lvl1pPr>
+            <a:lvl2pPr marL="457200" algn="l" defTabSz="914400" rtl="0" eaLnBrk="1" latinLnBrk="1" hangingPunct="1">
+              <a:defRPr sz="1800" kern="1200">
+                <a:solidFill>
+                  <a:schemeClr val="tx1"/>
+                </a:solidFill>
+                <a:latin typeface="+mn-lt"/>
+                <a:ea typeface="+mn-ea"/>
+                <a:cs typeface="+mn-cs"/>
+              </a:defRPr>
+            </a:lvl2pPr>
+            <a:lvl3pPr marL="914400" algn="l" defTabSz="914400" rtl="0" eaLnBrk="1" latinLnBrk="1" hangingPunct="1">
+              <a:defRPr sz="1800" kern="1200">
+                <a:solidFill>
+                  <a:schemeClr val="tx1"/>
+                </a:solidFill>
+                <a:latin typeface="+mn-lt"/>
+                <a:ea typeface="+mn-ea"/>
+                <a:cs typeface="+mn-cs"/>
+              </a:defRPr>
+            </a:lvl3pPr>
+            <a:lvl4pPr marL="1371600" algn="l" defTabSz="914400" rtl="0" eaLnBrk="1" latinLnBrk="1" hangingPunct="1">
+              <a:defRPr sz="1800" kern="1200">
+                <a:solidFill>
+                  <a:schemeClr val="tx1"/>
+                </a:solidFill>
+                <a:latin typeface="+mn-lt"/>
+                <a:ea typeface="+mn-ea"/>
+                <a:cs typeface="+mn-cs"/>
+              </a:defRPr>
+            </a:lvl4pPr>
+            <a:lvl5pPr marL="1828800" algn="l" defTabSz="914400" rtl="0" eaLnBrk="1" latinLnBrk="1" hangingPunct="1">
+              <a:defRPr sz="1800" kern="1200">
+                <a:solidFill>
+                  <a:schemeClr val="tx1"/>
+                </a:solidFill>
+                <a:latin typeface="+mn-lt"/>
+                <a:ea typeface="+mn-ea"/>
+                <a:cs typeface="+mn-cs"/>
+              </a:defRPr>
+            </a:lvl5pPr>
+            <a:lvl6pPr marL="2286000" algn="l" defTabSz="914400" rtl="0" eaLnBrk="1" latinLnBrk="1" hangingPunct="1">
+              <a:defRPr sz="1800" kern="1200">
+                <a:solidFill>
+                  <a:schemeClr val="tx1"/>
+                </a:solidFill>
+                <a:latin typeface="+mn-lt"/>
+                <a:ea typeface="+mn-ea"/>
+                <a:cs typeface="+mn-cs"/>
+              </a:defRPr>
+            </a:lvl6pPr>
+            <a:lvl7pPr marL="2743200" algn="l" defTabSz="914400" rtl="0" eaLnBrk="1" latinLnBrk="1" hangingPunct="1">
+              <a:defRPr sz="1800" kern="1200">
+                <a:solidFill>
+                  <a:schemeClr val="tx1"/>
+                </a:solidFill>
+                <a:latin typeface="+mn-lt"/>
+                <a:ea typeface="+mn-ea"/>
+                <a:cs typeface="+mn-cs"/>
+              </a:defRPr>
+            </a:lvl7pPr>
+            <a:lvl8pPr marL="3200400" algn="l" defTabSz="914400" rtl="0" eaLnBrk="1" latinLnBrk="1" hangingPunct="1">
+              <a:defRPr sz="1800" kern="1200">
+                <a:solidFill>
+                  <a:schemeClr val="tx1"/>
+                </a:solidFill>
+                <a:latin typeface="+mn-lt"/>
+                <a:ea typeface="+mn-ea"/>
+                <a:cs typeface="+mn-cs"/>
+              </a:defRPr>
+            </a:lvl8pPr>
+            <a:lvl9pPr marL="3657600" algn="l" defTabSz="914400" rtl="0" eaLnBrk="1" latinLnBrk="1" hangingPunct="1">
+              <a:defRPr sz="1800" kern="1200">
+                <a:solidFill>
+                  <a:schemeClr val="tx1"/>
+                </a:solidFill>
+                <a:latin typeface="+mn-lt"/>
+                <a:ea typeface="+mn-ea"/>
+                <a:cs typeface="+mn-cs"/>
+              </a:defRPr>
+            </a:lvl9pPr>
+          </a:lstStyle>
+          <a:p>
+            <a:pPr marL="0" marR="0" lvl="0" indent="0" algn="ctr" defTabSz="914400" rtl="0" eaLnBrk="1" fontAlgn="base" latinLnBrk="1" hangingPunct="1">
+              <a:lnSpc>
+                <a:spcPct val="100000"/>
+              </a:lnSpc>
+              <a:spcBef>
+                <a:spcPct val="0"/>
+              </a:spcBef>
+              <a:spcAft>
+                <a:spcPct val="0"/>
+              </a:spcAft>
+              <a:buClrTx/>
+              <a:buSzTx/>
+              <a:buFontTx/>
+              <a:buNone/>
+              <a:tabLst/>
+              <a:defRPr/>
+            </a:pPr>
+            <a:r>
+              <a:rPr kumimoji="1" lang="en-US" altLang="ko-KR" sz="1000" b="0" i="0" u="none" strike="noStrike" kern="1200" cap="none" spc="0" normalizeH="0" baseline="0" noProof="0" dirty="0" smtClean="0">
+                <a:ln>
+                  <a:noFill/>
+                </a:ln>
+                <a:solidFill>
+                  <a:prstClr val="white"/>
+                </a:solidFill>
+                <a:effectLst/>
+                <a:uLnTx/>
+                <a:uFillTx/>
+                <a:latin typeface="Arial"/>
+                <a:ea typeface="HY견고딕"/>
+              </a:rPr>
+              <a:t>2</a:t>
+            </a:r>
+            <a:endParaRPr kumimoji="1" lang="ko-KR" altLang="en-US" sz="1000" b="0" i="0" u="none" strike="noStrike" kern="1200" cap="none" spc="0" normalizeH="0" baseline="0" noProof="0" dirty="0">
+              <a:ln>
+                <a:noFill/>
+              </a:ln>
+              <a:solidFill>
+                <a:prstClr val="white"/>
+              </a:solidFill>
+              <a:effectLst/>
+              <a:uLnTx/>
+              <a:uFillTx/>
+              <a:latin typeface="Arial"/>
+              <a:ea typeface="HY견고딕"/>
+            </a:endParaRPr>
+          </a:p>
+        </p:txBody>
+      </p:sp>
+    </p:spTree>
+    <p:extLst>
+      <p:ext uri="{BB962C8B-B14F-4D97-AF65-F5344CB8AC3E}">
+        <p14:creationId xmlns:p14="http://schemas.microsoft.com/office/powerpoint/2010/main" val="2726796306"/>
+      </p:ext>
+    </p:extLst>
+  </p:cSld>
+  <p:clrMapOvr>
+    <a:masterClrMapping/>
+  </p:clrMapOvr>
+  <p:timing>
+    <p:tnLst>
+      <p:par>
+        <p:cTn id="1" dur="indefinite" restart="never" nodeType="tmRoot"/>
+      </p:par>
+    </p:tnLst>
+  </p:timing>
+</p:sld>
+</file>
+
+<file path=ppt/slides/slide7.xml><?xml version="1.0" encoding="utf-8"?>
 <p:sld xmlns:a="http://schemas.openxmlformats.org/drawingml/2006/main" xmlns:r="http://schemas.openxmlformats.org/officeDocument/2006/relationships" xmlns:p="http://schemas.openxmlformats.org/presentationml/2006/main">
   <p:cSld>
     <p:spTree>
@@ -5423,7 +6833,6 @@
               <a:rPr lang="ko-KR" altLang="en-US" dirty="0"/>
               <a:t>프로젝트 생성</a:t>
             </a:r>
-            <a:endParaRPr lang="ko-KR" altLang="en-US" dirty="0"/>
           </a:p>
         </p:txBody>
       </p:sp>
@@ -5464,7 +6873,7 @@
             <a:fld id="{D6667735-D60F-427D-9549-94E76B4725B0}" type="slidenum">
               <a:rPr lang="ko-KR" altLang="en-US" smtClean="0"/>
               <a:pPr/>
-              <a:t>5</a:t>
+              <a:t>6</a:t>
             </a:fld>
             <a:endParaRPr lang="ko-KR" altLang="en-US" dirty="0"/>
           </a:p>
@@ -6735,7 +8144,7 @@
 </p:sld>
 </file>
 
-<file path=ppt/slides/slide7.xml><?xml version="1.0" encoding="utf-8"?>
+<file path=ppt/slides/slide8.xml><?xml version="1.0" encoding="utf-8"?>
 <p:sld xmlns:a="http://schemas.openxmlformats.org/drawingml/2006/main" xmlns:r="http://schemas.openxmlformats.org/officeDocument/2006/relationships" xmlns:p="http://schemas.openxmlformats.org/presentationml/2006/main">
   <p:cSld>
     <p:spTree>
@@ -6878,7 +8287,7 @@
             <a:fld id="{D6667735-D60F-427D-9549-94E76B4725B0}" type="slidenum">
               <a:rPr lang="ko-KR" altLang="en-US" smtClean="0"/>
               <a:pPr/>
-              <a:t>6</a:t>
+              <a:t>7</a:t>
             </a:fld>
             <a:endParaRPr lang="ko-KR" altLang="en-US" dirty="0"/>
           </a:p>
@@ -7169,7 +8578,7 @@
 </p:sld>
 </file>
 
-<file path=ppt/slides/slide8.xml><?xml version="1.0" encoding="utf-8"?>
+<file path=ppt/slides/slide9.xml><?xml version="1.0" encoding="utf-8"?>
 <p:sld xmlns:a="http://schemas.openxmlformats.org/drawingml/2006/main" xmlns:r="http://schemas.openxmlformats.org/officeDocument/2006/relationships" xmlns:p="http://schemas.openxmlformats.org/presentationml/2006/main">
   <p:cSld>
     <p:spTree>
@@ -7312,7 +8721,7 @@
             <a:fld id="{D6667735-D60F-427D-9549-94E76B4725B0}" type="slidenum">
               <a:rPr lang="ko-KR" altLang="en-US" smtClean="0"/>
               <a:pPr/>
-              <a:t>7</a:t>
+              <a:t>8</a:t>
             </a:fld>
             <a:endParaRPr lang="ko-KR" altLang="en-US" dirty="0"/>
           </a:p>
@@ -7766,431 +9175,6 @@
     <p:extLst>
       <p:ext uri="{BB962C8B-B14F-4D97-AF65-F5344CB8AC3E}">
         <p14:creationId xmlns:p14="http://schemas.microsoft.com/office/powerpoint/2010/main" val="1866893403"/>
-      </p:ext>
-    </p:extLst>
-  </p:cSld>
-  <p:clrMapOvr>
-    <a:masterClrMapping/>
-  </p:clrMapOvr>
-  <p:timing>
-    <p:tnLst>
-      <p:par>
-        <p:cTn id="1" dur="indefinite" restart="never" nodeType="tmRoot"/>
-      </p:par>
-    </p:tnLst>
-  </p:timing>
-</p:sld>
-</file>
-
-<file path=ppt/slides/slide9.xml><?xml version="1.0" encoding="utf-8"?>
-<p:sld xmlns:a="http://schemas.openxmlformats.org/drawingml/2006/main" xmlns:r="http://schemas.openxmlformats.org/officeDocument/2006/relationships" xmlns:p="http://schemas.openxmlformats.org/presentationml/2006/main">
-  <p:cSld>
-    <p:spTree>
-      <p:nvGrpSpPr>
-        <p:cNvPr id="1" name=""/>
-        <p:cNvGrpSpPr/>
-        <p:nvPr/>
-      </p:nvGrpSpPr>
-      <p:grpSpPr>
-        <a:xfrm>
-          <a:off x="0" y="0"/>
-          <a:ext cx="0" cy="0"/>
-          <a:chOff x="0" y="0"/>
-          <a:chExt cx="0" cy="0"/>
-        </a:xfrm>
-      </p:grpSpPr>
-      <p:pic>
-        <p:nvPicPr>
-          <p:cNvPr id="34818" name="Picture 2"/>
-          <p:cNvPicPr>
-            <a:picLocks noChangeAspect="1" noChangeArrowheads="1"/>
-          </p:cNvPicPr>
-          <p:nvPr/>
-        </p:nvPicPr>
-        <p:blipFill>
-          <a:blip r:embed="rId2">
-            <a:extLst>
-              <a:ext uri="{28A0092B-C50C-407E-A947-70E740481C1C}">
-                <a14:useLocalDpi xmlns:a14="http://schemas.microsoft.com/office/drawing/2010/main" val="0"/>
-              </a:ext>
-            </a:extLst>
-          </a:blip>
-          <a:srcRect/>
-          <a:stretch>
-            <a:fillRect/>
-          </a:stretch>
-        </p:blipFill>
-        <p:spPr bwMode="auto">
-          <a:xfrm>
-            <a:off x="682179" y="2125389"/>
-            <a:ext cx="6316915" cy="4183931"/>
-          </a:xfrm>
-          <a:prstGeom prst="rect">
-            <a:avLst/>
-          </a:prstGeom>
-          <a:noFill/>
-          <a:ln>
-            <a:noFill/>
-          </a:ln>
-          <a:extLst>
-            <a:ext uri="{909E8E84-426E-40DD-AFC4-6F175D3DCCD1}">
-              <a14:hiddenFill xmlns:a14="http://schemas.microsoft.com/office/drawing/2010/main">
-                <a:solidFill>
-                  <a:schemeClr val="accent1"/>
-                </a:solidFill>
-              </a14:hiddenFill>
-            </a:ext>
-            <a:ext uri="{91240B29-F687-4F45-9708-019B960494DF}">
-              <a14:hiddenLine xmlns:a14="http://schemas.microsoft.com/office/drawing/2010/main" w="9525">
-                <a:solidFill>
-                  <a:schemeClr val="tx1"/>
-                </a:solidFill>
-                <a:miter lim="800000"/>
-                <a:headEnd/>
-                <a:tailEnd/>
-              </a14:hiddenLine>
-            </a:ext>
-          </a:extLst>
-        </p:spPr>
-      </p:pic>
-      <p:sp>
-        <p:nvSpPr>
-          <p:cNvPr id="2" name="제목 1"/>
-          <p:cNvSpPr>
-            <a:spLocks noGrp="1"/>
-          </p:cNvSpPr>
-          <p:nvPr>
-            <p:ph type="title"/>
-          </p:nvPr>
-        </p:nvSpPr>
-        <p:spPr/>
-        <p:txBody>
-          <a:bodyPr/>
-          <a:lstStyle/>
-          <a:p>
-            <a:r>
-              <a:rPr lang="en-US" altLang="ko-KR" dirty="0" err="1" smtClean="0"/>
-              <a:t>mosquitto</a:t>
-            </a:r>
-            <a:r>
-              <a:rPr lang="en-US" altLang="ko-KR" dirty="0" smtClean="0"/>
-              <a:t> </a:t>
-            </a:r>
-            <a:r>
-              <a:rPr lang="ko-KR" altLang="en-US" dirty="0" smtClean="0"/>
-              <a:t>프로젝트 설정 변경 </a:t>
-            </a:r>
-            <a:r>
-              <a:rPr lang="en-US" altLang="ko-KR" dirty="0" smtClean="0"/>
-              <a:t>#3</a:t>
-            </a:r>
-            <a:endParaRPr lang="ko-KR" altLang="en-US" dirty="0"/>
-          </a:p>
-        </p:txBody>
-      </p:sp>
-      <p:sp>
-        <p:nvSpPr>
-          <p:cNvPr id="3" name="바닥글 개체 틀 2"/>
-          <p:cNvSpPr>
-            <a:spLocks noGrp="1"/>
-          </p:cNvSpPr>
-          <p:nvPr>
-            <p:ph type="ftr" sz="quarter" idx="10"/>
-          </p:nvPr>
-        </p:nvSpPr>
-        <p:spPr/>
-        <p:txBody>
-          <a:bodyPr/>
-          <a:lstStyle/>
-          <a:p>
-            <a:endParaRPr lang="ko-KR" altLang="en-US" dirty="0"/>
-          </a:p>
-        </p:txBody>
-      </p:sp>
-      <p:sp>
-        <p:nvSpPr>
-          <p:cNvPr id="4" name="슬라이드 번호 개체 틀 3"/>
-          <p:cNvSpPr>
-            <a:spLocks noGrp="1"/>
-          </p:cNvSpPr>
-          <p:nvPr>
-            <p:ph type="sldNum" sz="quarter" idx="11"/>
-          </p:nvPr>
-        </p:nvSpPr>
-        <p:spPr/>
-        <p:txBody>
-          <a:bodyPr/>
-          <a:lstStyle/>
-          <a:p>
-            <a:fld id="{D6667735-D60F-427D-9549-94E76B4725B0}" type="slidenum">
-              <a:rPr lang="ko-KR" altLang="en-US" smtClean="0"/>
-              <a:pPr/>
-              <a:t>8</a:t>
-            </a:fld>
-            <a:endParaRPr lang="ko-KR" altLang="en-US" dirty="0"/>
-          </a:p>
-        </p:txBody>
-      </p:sp>
-      <p:sp>
-        <p:nvSpPr>
-          <p:cNvPr id="5" name="날짜 개체 틀 4"/>
-          <p:cNvSpPr>
-            <a:spLocks noGrp="1"/>
-          </p:cNvSpPr>
-          <p:nvPr>
-            <p:ph type="dt" sz="half" idx="12"/>
-          </p:nvPr>
-        </p:nvSpPr>
-        <p:spPr/>
-        <p:txBody>
-          <a:bodyPr/>
-          <a:lstStyle/>
-          <a:p>
-            <a:endParaRPr lang="ko-KR" altLang="en-US" dirty="0"/>
-          </a:p>
-        </p:txBody>
-      </p:sp>
-      <p:sp>
-        <p:nvSpPr>
-          <p:cNvPr id="91" name="내용 개체 틀 5"/>
-          <p:cNvSpPr>
-            <a:spLocks noGrp="1"/>
-          </p:cNvSpPr>
-          <p:nvPr>
-            <p:ph sz="quarter" idx="13"/>
-          </p:nvPr>
-        </p:nvSpPr>
-        <p:spPr>
-          <a:xfrm>
-            <a:off x="457200" y="1052736"/>
-            <a:ext cx="8229600" cy="864096"/>
-          </a:xfrm>
-        </p:spPr>
-        <p:txBody>
-          <a:bodyPr>
-            <a:normAutofit fontScale="92500" lnSpcReduction="20000"/>
-          </a:bodyPr>
-          <a:lstStyle/>
-          <a:p>
-            <a:r>
-              <a:rPr lang="ko-KR" altLang="en-US" dirty="0" smtClean="0"/>
-              <a:t>  </a:t>
-            </a:r>
-            <a:r>
-              <a:rPr lang="en-US" altLang="ko-KR" dirty="0" err="1" smtClean="0"/>
-              <a:t>mosquitto</a:t>
-            </a:r>
-            <a:r>
-              <a:rPr lang="en-US" altLang="ko-KR" dirty="0" smtClean="0"/>
-              <a:t> </a:t>
-            </a:r>
-            <a:r>
-              <a:rPr lang="ko-KR" altLang="en-US" dirty="0" smtClean="0"/>
-              <a:t>프로젝트의 </a:t>
-            </a:r>
-            <a:r>
-              <a:rPr lang="ko-KR" altLang="en-US" dirty="0" err="1" smtClean="0"/>
-              <a:t>전처리기</a:t>
-            </a:r>
-            <a:r>
-              <a:rPr lang="ko-KR" altLang="en-US" dirty="0" smtClean="0"/>
-              <a:t> 정의 항목에서 </a:t>
-            </a:r>
-            <a:r>
-              <a:rPr lang="en-US" altLang="ko-KR" dirty="0" smtClean="0"/>
-              <a:t>TLS </a:t>
-            </a:r>
-            <a:r>
-              <a:rPr lang="ko-KR" altLang="en-US" dirty="0" smtClean="0"/>
-              <a:t>지원</a:t>
-            </a:r>
-            <a:r>
-              <a:rPr lang="en-US" altLang="ko-KR" dirty="0" smtClean="0"/>
-              <a:t> </a:t>
-            </a:r>
-            <a:r>
-              <a:rPr lang="ko-KR" altLang="en-US" dirty="0" smtClean="0"/>
-              <a:t>제거</a:t>
-            </a:r>
-            <a:endParaRPr lang="en-US" altLang="ko-KR" dirty="0"/>
-          </a:p>
-          <a:p>
-            <a:pPr lvl="1"/>
-            <a:r>
-              <a:rPr lang="en-US" altLang="ko-KR" dirty="0" smtClean="0"/>
-              <a:t>OpenSSL </a:t>
-            </a:r>
-            <a:r>
-              <a:rPr lang="ko-KR" altLang="en-US" dirty="0" smtClean="0"/>
-              <a:t>버전이 달라서 컴파일이 안 되는 것으로 보임</a:t>
-            </a:r>
-            <a:endParaRPr lang="en-US" altLang="ko-KR" dirty="0" smtClean="0"/>
-          </a:p>
-        </p:txBody>
-      </p:sp>
-      <p:sp>
-        <p:nvSpPr>
-          <p:cNvPr id="22" name="직사각형 21"/>
-          <p:cNvSpPr/>
-          <p:nvPr/>
-        </p:nvSpPr>
-        <p:spPr>
-          <a:xfrm>
-            <a:off x="4499992" y="2564904"/>
-            <a:ext cx="1224136" cy="288031"/>
-          </a:xfrm>
-          <a:prstGeom prst="rect">
-            <a:avLst/>
-          </a:prstGeom>
-          <a:noFill/>
-          <a:ln w="15875">
-            <a:solidFill>
-              <a:srgbClr val="FF0000"/>
-            </a:solidFill>
-            <a:prstDash val="sysDash"/>
-          </a:ln>
-        </p:spPr>
-        <p:style>
-          <a:lnRef idx="2">
-            <a:schemeClr val="accent6"/>
-          </a:lnRef>
-          <a:fillRef idx="1">
-            <a:schemeClr val="lt1"/>
-          </a:fillRef>
-          <a:effectRef idx="0">
-            <a:schemeClr val="accent6"/>
-          </a:effectRef>
-          <a:fontRef idx="minor">
-            <a:schemeClr val="dk1"/>
-          </a:fontRef>
-        </p:style>
-        <p:txBody>
-          <a:bodyPr rtlCol="0" anchor="ctr"/>
-          <a:lstStyle/>
-          <a:p>
-            <a:pPr algn="ctr"/>
-            <a:endParaRPr lang="ko-KR" altLang="en-US"/>
-          </a:p>
-        </p:txBody>
-      </p:sp>
-      <p:sp>
-        <p:nvSpPr>
-          <p:cNvPr id="26" name="직사각형 25"/>
-          <p:cNvSpPr/>
-          <p:nvPr/>
-        </p:nvSpPr>
-        <p:spPr>
-          <a:xfrm>
-            <a:off x="4856265" y="3403044"/>
-            <a:ext cx="2808312" cy="241980"/>
-          </a:xfrm>
-          <a:prstGeom prst="rect">
-            <a:avLst/>
-          </a:prstGeom>
-          <a:solidFill>
-            <a:srgbClr val="FFFF00">
-              <a:alpha val="67000"/>
-            </a:srgbClr>
-          </a:solidFill>
-          <a:ln w="6350">
-            <a:solidFill>
-              <a:schemeClr val="accent1">
-                <a:lumMod val="75000"/>
-              </a:schemeClr>
-            </a:solidFill>
-            <a:prstDash val="dash"/>
-          </a:ln>
-        </p:spPr>
-        <p:style>
-          <a:lnRef idx="2">
-            <a:schemeClr val="accent2">
-              <a:shade val="50000"/>
-            </a:schemeClr>
-          </a:lnRef>
-          <a:fillRef idx="1">
-            <a:schemeClr val="accent2"/>
-          </a:fillRef>
-          <a:effectRef idx="0">
-            <a:schemeClr val="accent2"/>
-          </a:effectRef>
-          <a:fontRef idx="minor">
-            <a:schemeClr val="lt1"/>
-          </a:fontRef>
-        </p:style>
-        <p:txBody>
-          <a:bodyPr wrap="square" lIns="72000" tIns="36000" rIns="36000" bIns="36000" anchor="ctr">
-            <a:spAutoFit/>
-          </a:bodyPr>
-          <a:lstStyle/>
-          <a:p>
-            <a:r>
-              <a:rPr lang="en-US" altLang="ko-KR" sz="1100" b="1" dirty="0" smtClean="0">
-                <a:solidFill>
-                  <a:schemeClr val="tx1"/>
-                </a:solidFill>
-              </a:rPr>
-              <a:t>“WITH_TLS;WITH_TLS_PSK” </a:t>
-            </a:r>
-            <a:r>
-              <a:rPr lang="ko-KR" altLang="en-US" sz="1100" b="1" dirty="0" smtClean="0">
-                <a:solidFill>
-                  <a:schemeClr val="tx1"/>
-                </a:solidFill>
-              </a:rPr>
-              <a:t>제거</a:t>
-            </a:r>
-            <a:endParaRPr lang="en-US" altLang="ko-KR" sz="1100" b="1" dirty="0" smtClean="0">
-              <a:solidFill>
-                <a:schemeClr val="tx1"/>
-              </a:solidFill>
-            </a:endParaRPr>
-          </a:p>
-        </p:txBody>
-      </p:sp>
-      <p:cxnSp>
-        <p:nvCxnSpPr>
-          <p:cNvPr id="27" name="직선 화살표 연결선 26"/>
-          <p:cNvCxnSpPr>
-            <a:stCxn id="26" idx="0"/>
-            <a:endCxn id="22" idx="3"/>
-          </p:cNvCxnSpPr>
-          <p:nvPr/>
-        </p:nvCxnSpPr>
-        <p:spPr>
-          <a:xfrm flipH="1" flipV="1">
-            <a:off x="5724128" y="2708920"/>
-            <a:ext cx="536293" cy="694124"/>
-          </a:xfrm>
-          <a:prstGeom prst="straightConnector1">
-            <a:avLst/>
-          </a:prstGeom>
-          <a:ln w="9525">
-            <a:solidFill>
-              <a:srgbClr val="002060"/>
-            </a:solidFill>
-            <a:prstDash val="dash"/>
-            <a:tailEnd type="diamond"/>
-          </a:ln>
-        </p:spPr>
-        <p:style>
-          <a:lnRef idx="1">
-            <a:schemeClr val="accent1"/>
-          </a:lnRef>
-          <a:fillRef idx="0">
-            <a:schemeClr val="accent1"/>
-          </a:fillRef>
-          <a:effectRef idx="0">
-            <a:schemeClr val="accent1"/>
-          </a:effectRef>
-          <a:fontRef idx="minor">
-            <a:schemeClr val="tx1"/>
-          </a:fontRef>
-        </p:style>
-      </p:cxnSp>
-    </p:spTree>
-    <p:extLst>
-      <p:ext uri="{BB962C8B-B14F-4D97-AF65-F5344CB8AC3E}">
-        <p14:creationId xmlns:p14="http://schemas.microsoft.com/office/powerpoint/2010/main" val="552342770"/>
       </p:ext>
     </p:extLst>
   </p:cSld>

</xml_diff>